<commit_message>
Updated Projekt Schad.md finished the presentation
</commit_message>
<xml_diff>
--- a/Presentation.pptx
+++ b/Presentation.pptx
@@ -5,16 +5,20 @@
     <p:sldMasterId id="2147483696" r:id="rId1"/>
   </p:sldMasterIdLst>
   <p:notesMasterIdLst>
-    <p:notesMasterId r:id="rId6"/>
+    <p:notesMasterId r:id="rId10"/>
   </p:notesMasterIdLst>
   <p:handoutMasterIdLst>
-    <p:handoutMasterId r:id="rId7"/>
+    <p:handoutMasterId r:id="rId11"/>
   </p:handoutMasterIdLst>
   <p:sldIdLst>
     <p:sldId id="256" r:id="rId2"/>
-    <p:sldId id="257" r:id="rId3"/>
-    <p:sldId id="258" r:id="rId4"/>
-    <p:sldId id="259" r:id="rId5"/>
+    <p:sldId id="258" r:id="rId3"/>
+    <p:sldId id="261" r:id="rId4"/>
+    <p:sldId id="260" r:id="rId5"/>
+    <p:sldId id="264" r:id="rId6"/>
+    <p:sldId id="262" r:id="rId7"/>
+    <p:sldId id="263" r:id="rId8"/>
+    <p:sldId id="265" r:id="rId9"/>
   </p:sldIdLst>
   <p:sldSz cx="12192000" cy="6858000"/>
   <p:notesSz cx="6858000" cy="9144000"/>
@@ -304,7 +308,7 @@
           <a:p>
             <a:fld id="{FE4A961F-274D-4C6E-B92E-C08B31C14D47}" type="slidenum">
               <a:rPr lang="de-DE" smtClean="0"/>
-              <a:t>‹#›</a:t>
+              <a:t>‹Nr.›</a:t>
             </a:fld>
             <a:endParaRPr lang="de-DE"/>
           </a:p>
@@ -563,7 +567,7 @@
           <a:p>
             <a:fld id="{E5FE8E08-D4F7-4390-A6B0-F02581E7EA53}" type="slidenum">
               <a:rPr lang="de-DE" noProof="0" smtClean="0"/>
-              <a:t>‹#›</a:t>
+              <a:t>‹Nr.›</a:t>
             </a:fld>
             <a:endParaRPr lang="de-DE" noProof="0"/>
           </a:p>
@@ -965,7 +969,7 @@
             <a:fld id="{8A7A6979-0714-4377-B894-6BE4C2D6E202}" type="slidenum">
               <a:rPr lang="de-DE" noProof="0" smtClean="0"/>
               <a:pPr rtl="0"/>
-              <a:t>‹#›</a:t>
+              <a:t>‹Nr.›</a:t>
             </a:fld>
             <a:endParaRPr lang="de-DE" noProof="0"/>
           </a:p>
@@ -976,6 +980,9 @@
   <p:clrMapOvr>
     <a:overrideClrMapping bg1="dk1" tx1="lt1" bg2="dk2" tx2="lt2" accent1="accent1" accent2="accent2" accent3="accent3" accent4="accent4" accent5="accent5" accent6="accent6" hlink="hlink" folHlink="folHlink"/>
   </p:clrMapOvr>
+  <p:transition spd="slow">
+    <p:wipe/>
+  </p:transition>
 </p:sldLayout>
 </file>
 
@@ -1132,7 +1139,7 @@
             <a:pPr rtl="0"/>
             <a:fld id="{8A7A6979-0714-4377-B894-6BE4C2D6E202}" type="slidenum">
               <a:rPr lang="de-DE" noProof="0" smtClean="0"/>
-              <a:t>‹#›</a:t>
+              <a:t>‹Nr.›</a:t>
             </a:fld>
             <a:endParaRPr lang="de-DE" noProof="0"/>
           </a:p>
@@ -1143,6 +1150,9 @@
   <p:clrMapOvr>
     <a:masterClrMapping/>
   </p:clrMapOvr>
+  <p:transition spd="slow">
+    <p:wipe/>
+  </p:transition>
 </p:sldLayout>
 </file>
 
@@ -1309,7 +1319,7 @@
             <a:pPr rtl="0"/>
             <a:fld id="{8A7A6979-0714-4377-B894-6BE4C2D6E202}" type="slidenum">
               <a:rPr lang="de-DE" noProof="0" smtClean="0"/>
-              <a:t>‹#›</a:t>
+              <a:t>‹Nr.›</a:t>
             </a:fld>
             <a:endParaRPr lang="de-DE" noProof="0"/>
           </a:p>
@@ -1320,6 +1330,9 @@
   <p:clrMapOvr>
     <a:masterClrMapping/>
   </p:clrMapOvr>
+  <p:transition spd="slow">
+    <p:wipe/>
+  </p:transition>
 </p:sldLayout>
 </file>
 
@@ -1477,7 +1490,7 @@
             <a:fld id="{8A7A6979-0714-4377-B894-6BE4C2D6E202}" type="slidenum">
               <a:rPr lang="de-DE" noProof="0" smtClean="0"/>
               <a:pPr rtl="0"/>
-              <a:t>‹#›</a:t>
+              <a:t>‹Nr.›</a:t>
             </a:fld>
             <a:endParaRPr lang="de-DE" noProof="0"/>
           </a:p>
@@ -1488,6 +1501,9 @@
   <p:clrMapOvr>
     <a:masterClrMapping/>
   </p:clrMapOvr>
+  <p:transition spd="slow">
+    <p:wipe/>
+  </p:transition>
 </p:sldLayout>
 </file>
 
@@ -1744,7 +1760,7 @@
             <a:fld id="{8A7A6979-0714-4377-B894-6BE4C2D6E202}" type="slidenum">
               <a:rPr lang="de-DE" noProof="0" smtClean="0"/>
               <a:pPr rtl="0"/>
-              <a:t>‹#›</a:t>
+              <a:t>‹Nr.›</a:t>
             </a:fld>
             <a:endParaRPr lang="de-DE" noProof="0"/>
           </a:p>
@@ -1755,6 +1771,9 @@
   <p:clrMapOvr>
     <a:overrideClrMapping bg1="dk1" tx1="lt1" bg2="dk2" tx2="lt2" accent1="accent1" accent2="accent2" accent3="accent3" accent4="accent4" accent5="accent5" accent6="accent6" hlink="hlink" folHlink="folHlink"/>
   </p:clrMapOvr>
+  <p:transition spd="slow">
+    <p:wipe/>
+  </p:transition>
 </p:sldLayout>
 </file>
 
@@ -1972,7 +1991,7 @@
             <a:pPr rtl="0"/>
             <a:fld id="{8A7A6979-0714-4377-B894-6BE4C2D6E202}" type="slidenum">
               <a:rPr lang="de-DE" noProof="0" smtClean="0"/>
-              <a:t>‹#›</a:t>
+              <a:t>‹Nr.›</a:t>
             </a:fld>
             <a:endParaRPr lang="de-DE" noProof="0"/>
           </a:p>
@@ -1983,6 +2002,9 @@
   <p:clrMapOvr>
     <a:masterClrMapping/>
   </p:clrMapOvr>
+  <p:transition spd="slow">
+    <p:wipe/>
+  </p:transition>
 </p:sldLayout>
 </file>
 
@@ -2327,7 +2349,7 @@
             <a:pPr rtl="0"/>
             <a:fld id="{8A7A6979-0714-4377-B894-6BE4C2D6E202}" type="slidenum">
               <a:rPr lang="de-DE" noProof="0" smtClean="0"/>
-              <a:t>‹#›</a:t>
+              <a:t>‹Nr.›</a:t>
             </a:fld>
             <a:endParaRPr lang="de-DE" noProof="0"/>
           </a:p>
@@ -2361,6 +2383,9 @@
   <p:clrMapOvr>
     <a:masterClrMapping/>
   </p:clrMapOvr>
+  <p:transition spd="slow">
+    <p:wipe/>
+  </p:transition>
 </p:sldLayout>
 </file>
 
@@ -2466,7 +2491,7 @@
             <a:pPr rtl="0"/>
             <a:fld id="{8A7A6979-0714-4377-B894-6BE4C2D6E202}" type="slidenum">
               <a:rPr lang="de-DE" noProof="0" smtClean="0"/>
-              <a:t>‹#›</a:t>
+              <a:t>‹Nr.›</a:t>
             </a:fld>
             <a:endParaRPr lang="de-DE" noProof="0"/>
           </a:p>
@@ -2477,6 +2502,9 @@
   <p:clrMapOvr>
     <a:masterClrMapping/>
   </p:clrMapOvr>
+  <p:transition spd="slow">
+    <p:wipe/>
+  </p:transition>
 </p:sldLayout>
 </file>
 
@@ -2559,7 +2587,7 @@
             <a:pPr rtl="0"/>
             <a:fld id="{8A7A6979-0714-4377-B894-6BE4C2D6E202}" type="slidenum">
               <a:rPr lang="de-DE" noProof="0" smtClean="0"/>
-              <a:t>‹#›</a:t>
+              <a:t>‹Nr.›</a:t>
             </a:fld>
             <a:endParaRPr lang="de-DE" noProof="0"/>
           </a:p>
@@ -2570,6 +2598,9 @@
   <p:clrMapOvr>
     <a:masterClrMapping/>
   </p:clrMapOvr>
+  <p:transition spd="slow">
+    <p:wipe/>
+  </p:transition>
 </p:sldLayout>
 </file>
 
@@ -2928,7 +2959,7 @@
             <a:pPr rtl="0"/>
             <a:fld id="{8A7A6979-0714-4377-B894-6BE4C2D6E202}" type="slidenum">
               <a:rPr lang="de-DE" noProof="0" smtClean="0"/>
-              <a:t>‹#›</a:t>
+              <a:t>‹Nr.›</a:t>
             </a:fld>
             <a:endParaRPr lang="de-DE" noProof="0"/>
           </a:p>
@@ -2939,6 +2970,9 @@
   <p:clrMapOvr>
     <a:masterClrMapping/>
   </p:clrMapOvr>
+  <p:transition spd="slow">
+    <p:wipe/>
+  </p:transition>
 </p:sldLayout>
 </file>
 
@@ -3283,7 +3317,7 @@
             <a:pPr rtl="0"/>
             <a:fld id="{8A7A6979-0714-4377-B894-6BE4C2D6E202}" type="slidenum">
               <a:rPr lang="de-DE" noProof="0" smtClean="0"/>
-              <a:t>‹#›</a:t>
+              <a:t>‹Nr.›</a:t>
             </a:fld>
             <a:endParaRPr lang="de-DE" noProof="0"/>
           </a:p>
@@ -3294,6 +3328,9 @@
   <p:clrMapOvr>
     <a:masterClrMapping/>
   </p:clrMapOvr>
+  <p:transition spd="slow">
+    <p:wipe/>
+  </p:transition>
 </p:sldLayout>
 </file>
 
@@ -3549,7 +3586,7 @@
             <a:fld id="{8A7A6979-0714-4377-B894-6BE4C2D6E202}" type="slidenum">
               <a:rPr lang="de-DE" noProof="0" smtClean="0"/>
               <a:pPr rtl="0"/>
-              <a:t>‹#›</a:t>
+              <a:t>‹Nr.›</a:t>
             </a:fld>
             <a:endParaRPr lang="de-DE" noProof="0"/>
           </a:p>
@@ -3571,6 +3608,9 @@
     <p:sldLayoutId id="2147483706" r:id="rId10"/>
     <p:sldLayoutId id="2147483707" r:id="rId11"/>
   </p:sldLayoutIdLst>
+  <p:transition spd="slow">
+    <p:wipe/>
+  </p:transition>
   <p:hf sldNum="0" hdr="0" ftr="0" dt="0"/>
   <p:txStyles>
     <p:titleStyle>
@@ -3946,7 +3986,12 @@
             <p:ph type="subTitle" idx="1"/>
           </p:nvPr>
         </p:nvSpPr>
-        <p:spPr/>
+        <p:spPr>
+          <a:xfrm>
+            <a:off x="2695194" y="4370300"/>
+            <a:ext cx="6801612" cy="1239894"/>
+          </a:xfrm>
+        </p:spPr>
         <p:txBody>
           <a:bodyPr vert="horz" lIns="91440" tIns="45720" rIns="91440" bIns="45720" rtlCol="0" anchor="t">
             <a:normAutofit lnSpcReduction="10000"/>
@@ -3985,6 +4030,14 @@
   <p:clrMapOvr>
     <a:masterClrMapping/>
   </p:clrMapOvr>
+  <mc:AlternateContent xmlns:mc="http://schemas.openxmlformats.org/markup-compatibility/2006">
+    <mc:Choice xmlns:p14="http://schemas.microsoft.com/office/powerpoint/2010/main" Requires="p14">
+      <p:transition p14:dur="0"/>
+    </mc:Choice>
+    <mc:Fallback>
+      <p:transition/>
+    </mc:Fallback>
+  </mc:AlternateContent>
 </p:sld>
 </file>
 
@@ -4010,7 +4063,7 @@
           <p:cNvPr id="2" name="Title 1">
             <a:extLst>
               <a:ext uri="{FF2B5EF4-FFF2-40B4-BE49-F238E27FC236}">
-                <a16:creationId xmlns:a16="http://schemas.microsoft.com/office/drawing/2014/main" id="{25D2D544-08C7-0E7F-A1CF-C6AB3C0C5499}"/>
+                <a16:creationId xmlns:a16="http://schemas.microsoft.com/office/drawing/2014/main" id="{C7048BC2-4899-7A56-C7EA-7C48C2DCC425}"/>
               </a:ext>
             </a:extLst>
           </p:cNvPr>
@@ -4030,6 +4083,7 @@
               <a:rPr lang="en-US" dirty="0" err="1"/>
               <a:t>Projektziele</a:t>
             </a:r>
+            <a:endParaRPr lang="en-US" dirty="0"/>
           </a:p>
         </p:txBody>
       </p:sp>
@@ -4038,7 +4092,7 @@
           <p:cNvPr id="3" name="Content Placeholder 2">
             <a:extLst>
               <a:ext uri="{FF2B5EF4-FFF2-40B4-BE49-F238E27FC236}">
-                <a16:creationId xmlns:a16="http://schemas.microsoft.com/office/drawing/2014/main" id="{584F9516-70D1-B838-F848-F4A85087D973}"/>
+                <a16:creationId xmlns:a16="http://schemas.microsoft.com/office/drawing/2014/main" id="{DE48DA6F-55FE-5851-7CF6-27BA251ED75F}"/>
               </a:ext>
             </a:extLst>
           </p:cNvPr>
@@ -4049,198 +4103,81 @@
             <p:ph idx="1"/>
           </p:nvPr>
         </p:nvSpPr>
-        <p:spPr>
-          <a:xfrm>
-            <a:off x="1883061" y="2581600"/>
-            <a:ext cx="8915061" cy="3647612"/>
-          </a:xfrm>
-        </p:spPr>
+        <p:spPr/>
         <p:txBody>
           <a:bodyPr vert="horz" lIns="91440" tIns="45720" rIns="91440" bIns="45720" rtlCol="0" anchor="t">
-            <a:normAutofit/>
+            <a:noAutofit/>
           </a:bodyPr>
           <a:lstStyle/>
           <a:p>
             <a:r>
-              <a:rPr lang="de-AT" sz="2000" dirty="0">
+              <a:rPr lang="de-DE" sz="2000" dirty="0">
                 <a:ea typeface="+mn-lt"/>
                 <a:cs typeface="+mn-lt"/>
               </a:rPr>
-              <a:t>Programmieren</a:t>
-            </a:r>
+              <a:t>Programmieren eines 2D Schachspieles mit allen modernen Regeln</a:t>
+            </a:r>
+          </a:p>
+          <a:p>
             <a:r>
               <a:rPr lang="en-US" sz="2000" dirty="0">
                 <a:ea typeface="+mn-lt"/>
                 <a:cs typeface="+mn-lt"/>
               </a:rPr>
-              <a:t> des Spieles Schach </a:t>
+              <a:t>Multiplayer </a:t>
             </a:r>
             <a:r>
               <a:rPr lang="en-US" sz="2000" dirty="0" err="1">
                 <a:ea typeface="+mn-lt"/>
                 <a:cs typeface="+mn-lt"/>
               </a:rPr>
-              <a:t>mit</a:t>
+              <a:t>über</a:t>
             </a:r>
             <a:r>
               <a:rPr lang="en-US" sz="2000" dirty="0">
                 <a:ea typeface="+mn-lt"/>
                 <a:cs typeface="+mn-lt"/>
               </a:rPr>
-              <a:t> </a:t>
+              <a:t> das Internet und </a:t>
             </a:r>
             <a:r>
               <a:rPr lang="en-US" sz="2000" dirty="0" err="1">
                 <a:ea typeface="+mn-lt"/>
                 <a:cs typeface="+mn-lt"/>
               </a:rPr>
-              <a:t>allen</a:t>
-            </a:r>
-            <a:r>
-              <a:rPr lang="en-US" sz="2000" dirty="0">
-                <a:ea typeface="+mn-lt"/>
-                <a:cs typeface="+mn-lt"/>
-              </a:rPr>
-              <a:t> </a:t>
-            </a:r>
-            <a:r>
-              <a:rPr lang="en-US" sz="2000" dirty="0" err="1">
-                <a:ea typeface="+mn-lt"/>
-                <a:cs typeface="+mn-lt"/>
-              </a:rPr>
-              <a:t>modernen</a:t>
-            </a:r>
-            <a:r>
-              <a:rPr lang="en-US" sz="2000" dirty="0">
-                <a:ea typeface="+mn-lt"/>
-                <a:cs typeface="+mn-lt"/>
-              </a:rPr>
-              <a:t> </a:t>
-            </a:r>
-            <a:r>
-              <a:rPr lang="en-US" sz="2000" dirty="0" err="1">
-                <a:ea typeface="+mn-lt"/>
-                <a:cs typeface="+mn-lt"/>
-              </a:rPr>
-              <a:t>Regeln</a:t>
-            </a:r>
-            <a:r>
-              <a:rPr lang="en-US" sz="2000" dirty="0">
-                <a:ea typeface="+mn-lt"/>
-                <a:cs typeface="+mn-lt"/>
-              </a:rPr>
-              <a:t> </a:t>
-            </a:r>
-            <a:r>
-              <a:rPr lang="en-US" sz="2000" dirty="0" err="1">
-                <a:ea typeface="+mn-lt"/>
-                <a:cs typeface="+mn-lt"/>
-              </a:rPr>
-              <a:t>im</a:t>
-            </a:r>
-            <a:r>
-              <a:rPr lang="en-US" sz="2000" dirty="0">
-                <a:ea typeface="+mn-lt"/>
-                <a:cs typeface="+mn-lt"/>
-              </a:rPr>
-              <a:t> 2D Style.</a:t>
-            </a:r>
-          </a:p>
-          <a:p>
-            <a:pPr lvl="1"/>
-            <a:r>
-              <a:rPr lang="en-US" sz="1800" dirty="0">
-                <a:ea typeface="+mn-lt"/>
-                <a:cs typeface="+mn-lt"/>
-              </a:rPr>
-              <a:t>In Unity.</a:t>
-            </a:r>
-          </a:p>
-          <a:p>
-            <a:r>
-              <a:rPr lang="en-US" sz="2000" dirty="0">
-                <a:ea typeface="+mn-lt"/>
-                <a:cs typeface="+mn-lt"/>
-              </a:rPr>
-              <a:t>Multiplayer option für</a:t>
-            </a:r>
-          </a:p>
-          <a:p>
-            <a:pPr lvl="1"/>
-            <a:r>
-              <a:rPr lang="en-US" sz="1800" dirty="0">
-                <a:ea typeface="+mn-lt"/>
-                <a:cs typeface="+mn-lt"/>
-              </a:rPr>
-              <a:t>Lokal </a:t>
-            </a:r>
-            <a:r>
-              <a:rPr lang="en-US" sz="1800" dirty="0" err="1">
-                <a:ea typeface="+mn-lt"/>
-                <a:cs typeface="+mn-lt"/>
-              </a:rPr>
-              <a:t>als</a:t>
-            </a:r>
-            <a:r>
-              <a:rPr lang="en-US" sz="1800" dirty="0">
-                <a:ea typeface="+mn-lt"/>
-                <a:cs typeface="+mn-lt"/>
-              </a:rPr>
-              <a:t> Pass &amp; Play.</a:t>
-            </a:r>
-          </a:p>
-          <a:p>
-            <a:pPr lvl="1"/>
-            <a:r>
-              <a:rPr lang="en-US" sz="1800" dirty="0" err="1">
-                <a:ea typeface="+mn-lt"/>
-                <a:cs typeface="+mn-lt"/>
-              </a:rPr>
-              <a:t>Globaler</a:t>
-            </a:r>
-            <a:r>
-              <a:rPr lang="en-US" sz="1800" dirty="0">
-                <a:ea typeface="+mn-lt"/>
-                <a:cs typeface="+mn-lt"/>
-              </a:rPr>
-              <a:t> Multiplayer. </a:t>
-            </a:r>
+              <a:t>lokal</a:t>
+            </a:r>
+            <a:endParaRPr lang="en-US" sz="2000" dirty="0">
+              <a:ea typeface="+mn-lt"/>
+              <a:cs typeface="+mn-lt"/>
+            </a:endParaRPr>
           </a:p>
           <a:p>
             <a:r>
               <a:rPr lang="en-US" sz="2000" dirty="0"/>
-              <a:t>KI-Gegner</a:t>
-            </a:r>
-          </a:p>
-          <a:p>
-            <a:pPr lvl="1"/>
-            <a:endParaRPr lang="en-US" dirty="0"/>
-          </a:p>
-          <a:p>
-            <a:pPr lvl="1"/>
-            <a:endParaRPr lang="en-US" dirty="0"/>
-          </a:p>
-          <a:p>
-            <a:endParaRPr lang="en-US" dirty="0"/>
-          </a:p>
-          <a:p>
-            <a:endParaRPr lang="en-US"/>
-          </a:p>
-          <a:p>
-            <a:endParaRPr lang="en-US" dirty="0"/>
+              <a:t>KI-</a:t>
+            </a:r>
+            <a:r>
+              <a:rPr lang="en-US" sz="2000" dirty="0" err="1"/>
+              <a:t>Gegner</a:t>
+            </a:r>
+            <a:endParaRPr lang="en-US" sz="2000" dirty="0"/>
           </a:p>
         </p:txBody>
       </p:sp>
     </p:spTree>
     <p:extLst>
       <p:ext uri="{BB962C8B-B14F-4D97-AF65-F5344CB8AC3E}">
-        <p14:creationId xmlns:p14="http://schemas.microsoft.com/office/powerpoint/2010/main" val="2800323002"/>
+        <p14:creationId xmlns:p14="http://schemas.microsoft.com/office/powerpoint/2010/main" val="2878206837"/>
       </p:ext>
     </p:extLst>
   </p:cSld>
   <p:clrMapOvr>
     <a:masterClrMapping/>
   </p:clrMapOvr>
+  <p:transition spd="slow">
+    <p:wipe/>
+  </p:transition>
 </p:sld>
 </file>
 
@@ -4308,159 +4245,129 @@
         <p:spPr/>
         <p:txBody>
           <a:bodyPr vert="horz" lIns="91440" tIns="45720" rIns="91440" bIns="45720" rtlCol="0" anchor="t">
-            <a:normAutofit fontScale="85000" lnSpcReduction="20000"/>
+            <a:noAutofit/>
           </a:bodyPr>
           <a:lstStyle/>
           <a:p>
             <a:r>
-              <a:rPr lang="en-US" dirty="0" err="1"/>
+              <a:rPr lang="en-US" sz="2000" dirty="0" err="1"/>
               <a:t>Projektbetreuer</a:t>
             </a:r>
             <a:r>
-              <a:rPr lang="en-US" dirty="0"/>
-              <a:t>: Prof. </a:t>
-            </a:r>
-            <a:r>
-              <a:rPr lang="en-US" dirty="0">
-                <a:ea typeface="+mn-lt"/>
-                <a:cs typeface="+mn-lt"/>
-              </a:rPr>
-              <a:t>David </a:t>
-            </a:r>
-            <a:r>
-              <a:rPr lang="en-US" dirty="0" err="1"/>
+              <a:rPr lang="en-US" sz="2000" dirty="0"/>
+              <a:t>: Prof. David </a:t>
+            </a:r>
+            <a:r>
+              <a:rPr lang="en-US" sz="2000" dirty="0" err="1"/>
               <a:t>Klewein</a:t>
             </a:r>
-            <a:r>
-              <a:rPr lang="en-US" dirty="0"/>
-              <a:t> </a:t>
-            </a:r>
-          </a:p>
-          <a:p>
-            <a:r>
-              <a:rPr lang="en-US" dirty="0">
-                <a:ea typeface="+mn-lt"/>
-                <a:cs typeface="+mn-lt"/>
-              </a:rPr>
-              <a:t>Andreas Fuchs-Eisner</a:t>
-            </a:r>
-            <a:r>
-              <a:rPr lang="en-US" dirty="0"/>
-              <a:t>: </a:t>
-            </a:r>
-          </a:p>
-          <a:p>
-            <a:pPr lvl="1"/>
-            <a:r>
-              <a:rPr lang="en-US" dirty="0" err="1"/>
+            <a:endParaRPr lang="en-US" sz="2000" dirty="0"/>
+          </a:p>
+          <a:p>
+            <a:r>
+              <a:rPr lang="en-US" sz="2000" dirty="0" err="1"/>
               <a:t>Projektleiter</a:t>
             </a:r>
-            <a:endParaRPr lang="en-US"/>
-          </a:p>
-          <a:p>
-            <a:pPr lvl="1"/>
-            <a:r>
-              <a:rPr lang="en-US" dirty="0" err="1"/>
+            <a:r>
+              <a:rPr lang="en-US" sz="2000" dirty="0"/>
+              <a:t>:  Andreas Fuchs-Eisner</a:t>
+            </a:r>
+          </a:p>
+          <a:p>
+            <a:pPr lvl="1">
+              <a:buFont typeface="Symbol" panose="05050102010706020507" pitchFamily="18" charset="2"/>
+              <a:buChar char="-"/>
+            </a:pPr>
+            <a:r>
+              <a:rPr lang="en-US" sz="2000" dirty="0" err="1"/>
               <a:t>Programmierung</a:t>
             </a:r>
             <a:r>
-              <a:rPr lang="en-US" dirty="0"/>
+              <a:rPr lang="en-US" sz="2000" dirty="0"/>
               <a:t> der </a:t>
             </a:r>
             <a:r>
-              <a:rPr lang="en-US" dirty="0" err="1"/>
+              <a:rPr lang="en-US" sz="2000" dirty="0" err="1"/>
               <a:t>grundlegenden</a:t>
             </a:r>
             <a:r>
-              <a:rPr lang="en-US" dirty="0"/>
+              <a:rPr lang="en-US" sz="2000" dirty="0"/>
               <a:t> </a:t>
             </a:r>
             <a:r>
-              <a:rPr lang="en-US" dirty="0" err="1"/>
+              <a:rPr lang="en-US" sz="2000" dirty="0" err="1"/>
               <a:t>Spielmechaniken</a:t>
             </a:r>
-          </a:p>
-          <a:p>
-            <a:pPr lvl="1"/>
-            <a:endParaRPr lang="en-US" dirty="0"/>
-          </a:p>
-          <a:p>
-            <a:r>
-              <a:rPr lang="en-US" dirty="0"/>
-              <a:t>Alexander-David Beck:</a:t>
-            </a:r>
-          </a:p>
-          <a:p>
-            <a:pPr lvl="1"/>
-            <a:r>
-              <a:rPr lang="en-US" dirty="0" err="1"/>
-              <a:t>Entwicklung</a:t>
-            </a:r>
-            <a:r>
-              <a:rPr lang="en-US" dirty="0"/>
+            <a:endParaRPr lang="en-US" sz="2000" dirty="0"/>
+          </a:p>
+          <a:p>
+            <a:r>
+              <a:rPr lang="en-US" sz="2000" dirty="0" err="1"/>
+              <a:t>Projektmitglied</a:t>
+            </a:r>
+            <a:r>
+              <a:rPr lang="en-US" sz="2000" dirty="0"/>
+              <a:t>:  Alexander-David Beck</a:t>
+            </a:r>
+          </a:p>
+          <a:p>
+            <a:pPr lvl="1">
+              <a:buFont typeface="Symbol" panose="05050102010706020507" pitchFamily="18" charset="2"/>
+              <a:buChar char="-"/>
+            </a:pPr>
+            <a:r>
+              <a:rPr lang="en-US" sz="2000" dirty="0" err="1"/>
+              <a:t>Entwicklug</a:t>
+            </a:r>
+            <a:r>
+              <a:rPr lang="en-US" sz="2000" dirty="0"/>
               <a:t> der Multiplayer Mechanik</a:t>
             </a:r>
           </a:p>
           <a:p>
-            <a:pPr lvl="1"/>
-            <a:endParaRPr lang="en-US" dirty="0"/>
-          </a:p>
-          <a:p>
-            <a:r>
-              <a:rPr lang="en-US" dirty="0"/>
-              <a:t>Markus Schoder</a:t>
-            </a:r>
-          </a:p>
-          <a:p>
-            <a:pPr lvl="1"/>
-            <a:r>
-              <a:rPr lang="en-US" dirty="0" err="1"/>
+            <a:r>
+              <a:rPr lang="en-US" sz="2000" dirty="0" err="1"/>
+              <a:t>Projektmitglied</a:t>
+            </a:r>
+            <a:r>
+              <a:rPr lang="en-US" sz="2000" dirty="0"/>
+              <a:t>: Markus Schoder</a:t>
+            </a:r>
+          </a:p>
+          <a:p>
+            <a:pPr lvl="1">
+              <a:buFont typeface="Symbol" panose="05050102010706020507" pitchFamily="18" charset="2"/>
+              <a:buChar char="-"/>
+            </a:pPr>
+            <a:r>
+              <a:rPr lang="en-US" sz="2000" dirty="0" err="1"/>
               <a:t>Implementierung</a:t>
             </a:r>
             <a:r>
-              <a:rPr lang="en-US" dirty="0"/>
-              <a:t> des KI-Gegners</a:t>
-            </a:r>
-          </a:p>
-          <a:p>
-            <a:pPr lvl="1"/>
-            <a:endParaRPr lang="en-US" dirty="0"/>
-          </a:p>
-          <a:p>
-            <a:pPr marL="228600" lvl="1" indent="0">
-              <a:buNone/>
-            </a:pPr>
-            <a:endParaRPr lang="en-US" dirty="0"/>
-          </a:p>
-          <a:p>
-            <a:pPr marL="228600" lvl="1" indent="0">
-              <a:buNone/>
-            </a:pPr>
-            <a:endParaRPr lang="en-US" dirty="0"/>
-          </a:p>
-          <a:p>
-            <a:pPr lvl="1"/>
-            <a:endParaRPr lang="en-US" dirty="0"/>
-          </a:p>
-          <a:p>
-            <a:pPr lvl="1"/>
-            <a:endParaRPr lang="en-US" dirty="0"/>
-          </a:p>
-          <a:p>
-            <a:endParaRPr lang="en-US" dirty="0"/>
+              <a:rPr lang="en-US" sz="2000" dirty="0"/>
+              <a:t> des KI-</a:t>
+            </a:r>
+            <a:r>
+              <a:rPr lang="en-US" sz="2000" dirty="0" err="1"/>
+              <a:t>Gegners</a:t>
+            </a:r>
+            <a:endParaRPr lang="en-US" sz="2000" dirty="0"/>
           </a:p>
         </p:txBody>
       </p:sp>
     </p:spTree>
     <p:extLst>
       <p:ext uri="{BB962C8B-B14F-4D97-AF65-F5344CB8AC3E}">
-        <p14:creationId xmlns:p14="http://schemas.microsoft.com/office/powerpoint/2010/main" val="2878206837"/>
+        <p14:creationId xmlns:p14="http://schemas.microsoft.com/office/powerpoint/2010/main" val="2561635046"/>
       </p:ext>
     </p:extLst>
   </p:cSld>
   <p:clrMapOvr>
     <a:masterClrMapping/>
   </p:clrMapOvr>
+  <p:transition spd="slow">
+    <p:wipe/>
+  </p:transition>
 </p:sld>
 </file>
 
@@ -4486,7 +4393,7 @@
           <p:cNvPr id="2" name="Title 1">
             <a:extLst>
               <a:ext uri="{FF2B5EF4-FFF2-40B4-BE49-F238E27FC236}">
-                <a16:creationId xmlns:a16="http://schemas.microsoft.com/office/drawing/2014/main" id="{FE6F8F6C-0C79-52C2-2936-F50B3291AD08}"/>
+                <a16:creationId xmlns:a16="http://schemas.microsoft.com/office/drawing/2014/main" id="{C7048BC2-4899-7A56-C7EA-7C48C2DCC425}"/>
               </a:ext>
             </a:extLst>
           </p:cNvPr>
@@ -4504,17 +4411,18 @@
           <a:p>
             <a:r>
               <a:rPr lang="en-US" dirty="0" err="1"/>
-              <a:t>MeilenSteine</a:t>
-            </a:r>
-          </a:p>
-        </p:txBody>
-      </p:sp>
-      <p:sp>
-        <p:nvSpPr>
-          <p:cNvPr id="3" name="Content Placeholder 2">
+              <a:t>Meilensteine</a:t>
+            </a:r>
+            <a:endParaRPr lang="en-US" dirty="0"/>
+          </a:p>
+        </p:txBody>
+      </p:sp>
+      <p:sp>
+        <p:nvSpPr>
+          <p:cNvPr id="5" name="Inhaltsplatzhalter 4">
             <a:extLst>
               <a:ext uri="{FF2B5EF4-FFF2-40B4-BE49-F238E27FC236}">
-                <a16:creationId xmlns:a16="http://schemas.microsoft.com/office/drawing/2014/main" id="{5D201607-82C9-332E-7358-08910C9C0D8F}"/>
+                <a16:creationId xmlns:a16="http://schemas.microsoft.com/office/drawing/2014/main" id="{C0025546-0F03-7326-907D-469943098CDD}"/>
               </a:ext>
             </a:extLst>
           </p:cNvPr>
@@ -4527,28 +4435,589 @@
         </p:nvSpPr>
         <p:spPr/>
         <p:txBody>
-          <a:bodyPr vert="horz" lIns="91440" tIns="45720" rIns="91440" bIns="45720" rtlCol="0" anchor="t">
-            <a:normAutofit/>
-          </a:bodyPr>
-          <a:lstStyle/>
-          <a:p>
-            <a:endParaRPr lang="en-US" dirty="0"/>
-          </a:p>
-          <a:p>
-            <a:endParaRPr lang="en-US" dirty="0"/>
+          <a:bodyPr/>
+          <a:lstStyle/>
+          <a:p>
+            <a:r>
+              <a:rPr lang="de-DE" dirty="0"/>
+              <a:t>In GitHub sowie </a:t>
+            </a:r>
+            <a:r>
+              <a:rPr lang="de-DE" dirty="0" err="1"/>
+              <a:t>Git</a:t>
+            </a:r>
+            <a:r>
+              <a:rPr lang="de-DE" dirty="0"/>
+              <a:t> einarbeitet</a:t>
+            </a:r>
+          </a:p>
+          <a:p>
+            <a:r>
+              <a:rPr lang="de-DE" dirty="0"/>
+              <a:t>In Unity C# einarbeitet</a:t>
+            </a:r>
+          </a:p>
+          <a:p>
+            <a:r>
+              <a:rPr lang="de-DE" dirty="0"/>
+              <a:t>Grundlegende Spielmechaniken programmiert</a:t>
+            </a:r>
+          </a:p>
+          <a:p>
+            <a:r>
+              <a:rPr lang="de-DE" dirty="0"/>
+              <a:t>Multiplayers programmiert und integriert</a:t>
+            </a:r>
+          </a:p>
+          <a:p>
+            <a:r>
+              <a:rPr lang="de-DE" dirty="0"/>
+              <a:t>KI-Gegner programmiert und integriert</a:t>
+            </a:r>
+          </a:p>
+          <a:p>
+            <a:r>
+              <a:rPr lang="de-DE" dirty="0"/>
+              <a:t>Multiplayer sowie KI-Gegner getestet</a:t>
+            </a:r>
+          </a:p>
+          <a:p>
+            <a:r>
+              <a:rPr lang="de-DE" dirty="0"/>
+              <a:t>Projekt abgeschlossen</a:t>
+            </a:r>
+          </a:p>
+          <a:p>
+            <a:endParaRPr lang="de-DE" dirty="0"/>
+          </a:p>
+          <a:p>
+            <a:endParaRPr lang="de-DE" dirty="0"/>
+          </a:p>
+          <a:p>
+            <a:pPr lvl="1"/>
+            <a:endParaRPr lang="de-AT" dirty="0"/>
           </a:p>
         </p:txBody>
       </p:sp>
     </p:spTree>
     <p:extLst>
       <p:ext uri="{BB962C8B-B14F-4D97-AF65-F5344CB8AC3E}">
-        <p14:creationId xmlns:p14="http://schemas.microsoft.com/office/powerpoint/2010/main" val="2163871827"/>
+        <p14:creationId xmlns:p14="http://schemas.microsoft.com/office/powerpoint/2010/main" val="2813363473"/>
       </p:ext>
     </p:extLst>
   </p:cSld>
   <p:clrMapOvr>
     <a:masterClrMapping/>
   </p:clrMapOvr>
+  <p:transition spd="slow">
+    <p:wipe/>
+  </p:transition>
+</p:sld>
+</file>
+
+<file path=ppt/slides/slide5.xml><?xml version="1.0" encoding="utf-8"?>
+<p:sld xmlns:a="http://schemas.openxmlformats.org/drawingml/2006/main" xmlns:r="http://schemas.openxmlformats.org/officeDocument/2006/relationships" xmlns:p="http://schemas.openxmlformats.org/presentationml/2006/main">
+  <p:cSld>
+    <p:spTree>
+      <p:nvGrpSpPr>
+        <p:cNvPr id="1" name=""/>
+        <p:cNvGrpSpPr/>
+        <p:nvPr/>
+      </p:nvGrpSpPr>
+      <p:grpSpPr>
+        <a:xfrm>
+          <a:off x="0" y="0"/>
+          <a:ext cx="0" cy="0"/>
+          <a:chOff x="0" y="0"/>
+          <a:chExt cx="0" cy="0"/>
+        </a:xfrm>
+      </p:grpSpPr>
+      <p:sp>
+        <p:nvSpPr>
+          <p:cNvPr id="2" name="Title 1">
+            <a:extLst>
+              <a:ext uri="{FF2B5EF4-FFF2-40B4-BE49-F238E27FC236}">
+                <a16:creationId xmlns:a16="http://schemas.microsoft.com/office/drawing/2014/main" id="{C7048BC2-4899-7A56-C7EA-7C48C2DCC425}"/>
+              </a:ext>
+            </a:extLst>
+          </p:cNvPr>
+          <p:cNvSpPr>
+            <a:spLocks noGrp="1"/>
+          </p:cNvSpPr>
+          <p:nvPr>
+            <p:ph type="title"/>
+          </p:nvPr>
+        </p:nvSpPr>
+        <p:spPr/>
+        <p:txBody>
+          <a:bodyPr/>
+          <a:lstStyle/>
+          <a:p>
+            <a:r>
+              <a:rPr lang="en-US" dirty="0"/>
+              <a:t>Andreas Fuchs-Eisner</a:t>
+            </a:r>
+          </a:p>
+        </p:txBody>
+      </p:sp>
+      <p:sp>
+        <p:nvSpPr>
+          <p:cNvPr id="5" name="Inhaltsplatzhalter 4">
+            <a:extLst>
+              <a:ext uri="{FF2B5EF4-FFF2-40B4-BE49-F238E27FC236}">
+                <a16:creationId xmlns:a16="http://schemas.microsoft.com/office/drawing/2014/main" id="{C0025546-0F03-7326-907D-469943098CDD}"/>
+              </a:ext>
+            </a:extLst>
+          </p:cNvPr>
+          <p:cNvSpPr>
+            <a:spLocks noGrp="1"/>
+          </p:cNvSpPr>
+          <p:nvPr>
+            <p:ph idx="1"/>
+          </p:nvPr>
+        </p:nvSpPr>
+        <p:spPr/>
+        <p:txBody>
+          <a:bodyPr>
+            <a:normAutofit/>
+          </a:bodyPr>
+          <a:lstStyle/>
+          <a:p>
+            <a:pPr marL="0" indent="0">
+              <a:buNone/>
+            </a:pPr>
+            <a:r>
+              <a:rPr lang="de-DE" b="1" dirty="0"/>
+              <a:t>Zuständigkeiten:</a:t>
+            </a:r>
+          </a:p>
+          <a:p>
+            <a:r>
+              <a:rPr lang="de-DE" dirty="0"/>
+              <a:t>Game-Design</a:t>
+            </a:r>
+          </a:p>
+          <a:p>
+            <a:pPr lvl="1">
+              <a:buFont typeface="Symbol" panose="05050102010706020507" pitchFamily="18" charset="2"/>
+              <a:buChar char="-"/>
+            </a:pPr>
+            <a:r>
+              <a:rPr lang="de-DE" dirty="0"/>
+              <a:t>Schachregeln ausarbeiten</a:t>
+            </a:r>
+          </a:p>
+          <a:p>
+            <a:r>
+              <a:rPr lang="de-DE" dirty="0"/>
+              <a:t>Design</a:t>
+            </a:r>
+          </a:p>
+          <a:p>
+            <a:pPr lvl="1">
+              <a:buFont typeface="Symbol" panose="05050102010706020507" pitchFamily="18" charset="2"/>
+              <a:buChar char="-"/>
+            </a:pPr>
+            <a:r>
+              <a:rPr lang="de-DE" dirty="0"/>
+              <a:t>Design des Games</a:t>
+            </a:r>
+          </a:p>
+          <a:p>
+            <a:r>
+              <a:rPr lang="de-DE" dirty="0"/>
+              <a:t>Programmierung (Unity C#)</a:t>
+            </a:r>
+          </a:p>
+          <a:p>
+            <a:pPr lvl="1">
+              <a:buFont typeface="Symbol" panose="05050102010706020507" pitchFamily="18" charset="2"/>
+              <a:buChar char="-"/>
+            </a:pPr>
+            <a:r>
+              <a:rPr lang="de-DE" dirty="0"/>
+              <a:t>Grundlegende Spielmechaniken</a:t>
+            </a:r>
+          </a:p>
+          <a:p>
+            <a:pPr lvl="1">
+              <a:buFont typeface="Symbol" panose="05050102010706020507" pitchFamily="18" charset="2"/>
+              <a:buChar char="-"/>
+            </a:pPr>
+            <a:endParaRPr lang="de-DE" b="1" dirty="0"/>
+          </a:p>
+          <a:p>
+            <a:pPr lvl="1"/>
+            <a:endParaRPr lang="de-AT" dirty="0"/>
+          </a:p>
+        </p:txBody>
+      </p:sp>
+    </p:spTree>
+    <p:extLst>
+      <p:ext uri="{BB962C8B-B14F-4D97-AF65-F5344CB8AC3E}">
+        <p14:creationId xmlns:p14="http://schemas.microsoft.com/office/powerpoint/2010/main" val="363792915"/>
+      </p:ext>
+    </p:extLst>
+  </p:cSld>
+  <p:clrMapOvr>
+    <a:masterClrMapping/>
+  </p:clrMapOvr>
+  <p:transition spd="slow">
+    <p:wipe/>
+  </p:transition>
+</p:sld>
+</file>
+
+<file path=ppt/slides/slide6.xml><?xml version="1.0" encoding="utf-8"?>
+<p:sld xmlns:a="http://schemas.openxmlformats.org/drawingml/2006/main" xmlns:r="http://schemas.openxmlformats.org/officeDocument/2006/relationships" xmlns:p="http://schemas.openxmlformats.org/presentationml/2006/main">
+  <p:cSld>
+    <p:spTree>
+      <p:nvGrpSpPr>
+        <p:cNvPr id="1" name=""/>
+        <p:cNvGrpSpPr/>
+        <p:nvPr/>
+      </p:nvGrpSpPr>
+      <p:grpSpPr>
+        <a:xfrm>
+          <a:off x="0" y="0"/>
+          <a:ext cx="0" cy="0"/>
+          <a:chOff x="0" y="0"/>
+          <a:chExt cx="0" cy="0"/>
+        </a:xfrm>
+      </p:grpSpPr>
+      <p:sp>
+        <p:nvSpPr>
+          <p:cNvPr id="2" name="Title 1">
+            <a:extLst>
+              <a:ext uri="{FF2B5EF4-FFF2-40B4-BE49-F238E27FC236}">
+                <a16:creationId xmlns:a16="http://schemas.microsoft.com/office/drawing/2014/main" id="{C7048BC2-4899-7A56-C7EA-7C48C2DCC425}"/>
+              </a:ext>
+            </a:extLst>
+          </p:cNvPr>
+          <p:cNvSpPr>
+            <a:spLocks noGrp="1"/>
+          </p:cNvSpPr>
+          <p:nvPr>
+            <p:ph type="title"/>
+          </p:nvPr>
+        </p:nvSpPr>
+        <p:spPr/>
+        <p:txBody>
+          <a:bodyPr/>
+          <a:lstStyle/>
+          <a:p>
+            <a:r>
+              <a:rPr lang="en-US" dirty="0"/>
+              <a:t>Alexander-David beck</a:t>
+            </a:r>
+          </a:p>
+        </p:txBody>
+      </p:sp>
+      <p:sp>
+        <p:nvSpPr>
+          <p:cNvPr id="5" name="Inhaltsplatzhalter 4">
+            <a:extLst>
+              <a:ext uri="{FF2B5EF4-FFF2-40B4-BE49-F238E27FC236}">
+                <a16:creationId xmlns:a16="http://schemas.microsoft.com/office/drawing/2014/main" id="{C0025546-0F03-7326-907D-469943098CDD}"/>
+              </a:ext>
+            </a:extLst>
+          </p:cNvPr>
+          <p:cNvSpPr>
+            <a:spLocks noGrp="1"/>
+          </p:cNvSpPr>
+          <p:nvPr>
+            <p:ph idx="1"/>
+          </p:nvPr>
+        </p:nvSpPr>
+        <p:spPr/>
+        <p:txBody>
+          <a:bodyPr/>
+          <a:lstStyle/>
+          <a:p>
+            <a:pPr marL="0" indent="0">
+              <a:buNone/>
+            </a:pPr>
+            <a:r>
+              <a:rPr lang="de-DE" b="1" dirty="0"/>
+              <a:t>Zuständigkeiten</a:t>
+            </a:r>
+            <a:r>
+              <a:rPr lang="de-DE" dirty="0"/>
+              <a:t>:</a:t>
+            </a:r>
+          </a:p>
+          <a:p>
+            <a:r>
+              <a:rPr lang="de-DE" dirty="0"/>
+              <a:t>Programmierung (Unity C#)</a:t>
+            </a:r>
+          </a:p>
+          <a:p>
+            <a:pPr lvl="1">
+              <a:buFont typeface="Symbol" panose="05050102010706020507" pitchFamily="18" charset="2"/>
+              <a:buChar char="-"/>
+            </a:pPr>
+            <a:r>
+              <a:rPr lang="de-DE" dirty="0"/>
+              <a:t>Multiplayer Topologie ausarbeiten und entwickeln</a:t>
+            </a:r>
+          </a:p>
+          <a:p>
+            <a:pPr lvl="1">
+              <a:buFont typeface="Symbol" panose="05050102010706020507" pitchFamily="18" charset="2"/>
+              <a:buChar char="-"/>
+            </a:pPr>
+            <a:r>
+              <a:rPr lang="de-DE" dirty="0"/>
+              <a:t>Multiplayer </a:t>
+            </a:r>
+            <a:r>
+              <a:rPr lang="de-DE" dirty="0" err="1"/>
+              <a:t>movement</a:t>
+            </a:r>
+            <a:endParaRPr lang="de-DE" dirty="0"/>
+          </a:p>
+          <a:p>
+            <a:pPr lvl="1">
+              <a:buFont typeface="Symbol" panose="05050102010706020507" pitchFamily="18" charset="2"/>
+              <a:buChar char="-"/>
+            </a:pPr>
+            <a:r>
+              <a:rPr lang="de-DE" dirty="0"/>
+              <a:t>TCP Chat</a:t>
+            </a:r>
+          </a:p>
+          <a:p>
+            <a:pPr lvl="1"/>
+            <a:endParaRPr lang="de-AT" dirty="0"/>
+          </a:p>
+        </p:txBody>
+      </p:sp>
+    </p:spTree>
+    <p:extLst>
+      <p:ext uri="{BB962C8B-B14F-4D97-AF65-F5344CB8AC3E}">
+        <p14:creationId xmlns:p14="http://schemas.microsoft.com/office/powerpoint/2010/main" val="3079869272"/>
+      </p:ext>
+    </p:extLst>
+  </p:cSld>
+  <p:clrMapOvr>
+    <a:masterClrMapping/>
+  </p:clrMapOvr>
+  <p:transition spd="slow">
+    <p:wipe/>
+  </p:transition>
+</p:sld>
+</file>
+
+<file path=ppt/slides/slide7.xml><?xml version="1.0" encoding="utf-8"?>
+<p:sld xmlns:a="http://schemas.openxmlformats.org/drawingml/2006/main" xmlns:r="http://schemas.openxmlformats.org/officeDocument/2006/relationships" xmlns:p="http://schemas.openxmlformats.org/presentationml/2006/main">
+  <p:cSld>
+    <p:spTree>
+      <p:nvGrpSpPr>
+        <p:cNvPr id="1" name=""/>
+        <p:cNvGrpSpPr/>
+        <p:nvPr/>
+      </p:nvGrpSpPr>
+      <p:grpSpPr>
+        <a:xfrm>
+          <a:off x="0" y="0"/>
+          <a:ext cx="0" cy="0"/>
+          <a:chOff x="0" y="0"/>
+          <a:chExt cx="0" cy="0"/>
+        </a:xfrm>
+      </p:grpSpPr>
+      <p:sp>
+        <p:nvSpPr>
+          <p:cNvPr id="2" name="Title 1">
+            <a:extLst>
+              <a:ext uri="{FF2B5EF4-FFF2-40B4-BE49-F238E27FC236}">
+                <a16:creationId xmlns:a16="http://schemas.microsoft.com/office/drawing/2014/main" id="{C7048BC2-4899-7A56-C7EA-7C48C2DCC425}"/>
+              </a:ext>
+            </a:extLst>
+          </p:cNvPr>
+          <p:cNvSpPr>
+            <a:spLocks noGrp="1"/>
+          </p:cNvSpPr>
+          <p:nvPr>
+            <p:ph type="title"/>
+          </p:nvPr>
+        </p:nvSpPr>
+        <p:spPr/>
+        <p:txBody>
+          <a:bodyPr/>
+          <a:lstStyle/>
+          <a:p>
+            <a:r>
+              <a:rPr lang="en-US" dirty="0"/>
+              <a:t>Markus </a:t>
+            </a:r>
+            <a:r>
+              <a:rPr lang="en-US" dirty="0" err="1"/>
+              <a:t>schoder</a:t>
+            </a:r>
+            <a:endParaRPr lang="en-US" dirty="0"/>
+          </a:p>
+        </p:txBody>
+      </p:sp>
+      <p:sp>
+        <p:nvSpPr>
+          <p:cNvPr id="5" name="Inhaltsplatzhalter 4">
+            <a:extLst>
+              <a:ext uri="{FF2B5EF4-FFF2-40B4-BE49-F238E27FC236}">
+                <a16:creationId xmlns:a16="http://schemas.microsoft.com/office/drawing/2014/main" id="{C0025546-0F03-7326-907D-469943098CDD}"/>
+              </a:ext>
+            </a:extLst>
+          </p:cNvPr>
+          <p:cNvSpPr>
+            <a:spLocks noGrp="1"/>
+          </p:cNvSpPr>
+          <p:nvPr>
+            <p:ph idx="1"/>
+          </p:nvPr>
+        </p:nvSpPr>
+        <p:spPr/>
+        <p:txBody>
+          <a:bodyPr/>
+          <a:lstStyle/>
+          <a:p>
+            <a:pPr marL="0" indent="0">
+              <a:buNone/>
+            </a:pPr>
+            <a:r>
+              <a:rPr lang="de-DE" b="1" dirty="0"/>
+              <a:t>Zuständigkeiten</a:t>
+            </a:r>
+            <a:r>
+              <a:rPr lang="de-DE" dirty="0"/>
+              <a:t>:</a:t>
+            </a:r>
+          </a:p>
+          <a:p>
+            <a:r>
+              <a:rPr lang="de-DE" dirty="0"/>
+              <a:t>Programmierung (Unity C#)</a:t>
+            </a:r>
+          </a:p>
+          <a:p>
+            <a:pPr lvl="1">
+              <a:buFont typeface="Symbol" panose="05050102010706020507" pitchFamily="18" charset="2"/>
+              <a:buChar char="-"/>
+            </a:pPr>
+            <a:r>
+              <a:rPr lang="de-DE" dirty="0"/>
+              <a:t>KI-Gegner</a:t>
+            </a:r>
+          </a:p>
+        </p:txBody>
+      </p:sp>
+    </p:spTree>
+    <p:extLst>
+      <p:ext uri="{BB962C8B-B14F-4D97-AF65-F5344CB8AC3E}">
+        <p14:creationId xmlns:p14="http://schemas.microsoft.com/office/powerpoint/2010/main" val="1206349441"/>
+      </p:ext>
+    </p:extLst>
+  </p:cSld>
+  <p:clrMapOvr>
+    <a:masterClrMapping/>
+  </p:clrMapOvr>
+  <p:transition spd="slow">
+    <p:wipe/>
+  </p:transition>
+</p:sld>
+</file>
+
+<file path=ppt/slides/slide8.xml><?xml version="1.0" encoding="utf-8"?>
+<p:sld xmlns:a="http://schemas.openxmlformats.org/drawingml/2006/main" xmlns:r="http://schemas.openxmlformats.org/officeDocument/2006/relationships" xmlns:p="http://schemas.openxmlformats.org/presentationml/2006/main">
+  <p:cSld>
+    <p:spTree>
+      <p:nvGrpSpPr>
+        <p:cNvPr id="1" name=""/>
+        <p:cNvGrpSpPr/>
+        <p:nvPr/>
+      </p:nvGrpSpPr>
+      <p:grpSpPr>
+        <a:xfrm>
+          <a:off x="0" y="0"/>
+          <a:ext cx="0" cy="0"/>
+          <a:chOff x="0" y="0"/>
+          <a:chExt cx="0" cy="0"/>
+        </a:xfrm>
+      </p:grpSpPr>
+      <p:sp>
+        <p:nvSpPr>
+          <p:cNvPr id="2" name="Titel 1">
+            <a:extLst>
+              <a:ext uri="{FF2B5EF4-FFF2-40B4-BE49-F238E27FC236}">
+                <a16:creationId xmlns:a16="http://schemas.microsoft.com/office/drawing/2014/main" id="{25E89497-8DE5-67B9-8C71-981CC54CEA0C}"/>
+              </a:ext>
+            </a:extLst>
+          </p:cNvPr>
+          <p:cNvSpPr>
+            <a:spLocks noGrp="1"/>
+          </p:cNvSpPr>
+          <p:nvPr>
+            <p:ph type="ctrTitle"/>
+          </p:nvPr>
+        </p:nvSpPr>
+        <p:spPr/>
+        <p:txBody>
+          <a:bodyPr/>
+          <a:lstStyle/>
+          <a:p>
+            <a:r>
+              <a:rPr lang="de-DE" dirty="0"/>
+              <a:t>Vielen dank für ihre </a:t>
+            </a:r>
+            <a:r>
+              <a:rPr lang="de-DE" dirty="0" err="1"/>
+              <a:t>aufmerksamkeit</a:t>
+            </a:r>
+            <a:r>
+              <a:rPr lang="de-DE" dirty="0"/>
+              <a:t>!</a:t>
+            </a:r>
+            <a:endParaRPr lang="de-AT" dirty="0"/>
+          </a:p>
+        </p:txBody>
+      </p:sp>
+      <p:sp>
+        <p:nvSpPr>
+          <p:cNvPr id="3" name="Untertitel 2">
+            <a:extLst>
+              <a:ext uri="{FF2B5EF4-FFF2-40B4-BE49-F238E27FC236}">
+                <a16:creationId xmlns:a16="http://schemas.microsoft.com/office/drawing/2014/main" id="{631FE2DC-13EF-4EFA-31C3-8164E280EFF5}"/>
+              </a:ext>
+            </a:extLst>
+          </p:cNvPr>
+          <p:cNvSpPr>
+            <a:spLocks noGrp="1"/>
+          </p:cNvSpPr>
+          <p:nvPr>
+            <p:ph type="subTitle" idx="1"/>
+          </p:nvPr>
+        </p:nvSpPr>
+        <p:spPr/>
+        <p:txBody>
+          <a:bodyPr/>
+          <a:lstStyle/>
+          <a:p>
+            <a:endParaRPr lang="de-AT"/>
+          </a:p>
+        </p:txBody>
+      </p:sp>
+    </p:spTree>
+    <p:extLst>
+      <p:ext uri="{BB962C8B-B14F-4D97-AF65-F5344CB8AC3E}">
+        <p14:creationId xmlns:p14="http://schemas.microsoft.com/office/powerpoint/2010/main" val="775700740"/>
+      </p:ext>
+    </p:extLst>
+  </p:cSld>
+  <p:clrMapOvr>
+    <a:masterClrMapping/>
+  </p:clrMapOvr>
+  <p:transition spd="slow">
+    <p:wipe/>
+  </p:transition>
 </p:sld>
 </file>
 

</xml_diff>